<commit_message>
Links das provas de Python e correcão em palavra no slide de Arquivos
</commit_message>
<xml_diff>
--- a/aulas/poo/backes/AulaPython09-Arquivos.pptx
+++ b/aulas/poo/backes/AulaPython09-Arquivos.pptx
@@ -221,7 +221,7 @@
           <a:p>
             <a:fld id="{1D8BD707-D9CF-40AE-B4C6-C98DA3205C09}" type="datetimeFigureOut">
               <a:rPr lang="en-US"/>
-              <a:t>2/22/2024</a:t>
+              <a:t>2/28/2024</a:t>
             </a:fld>
             <a:endParaRPr lang="en-US"/>
           </a:p>
@@ -450,7 +450,7 @@
           <a:p>
             <a:fld id="{1D8BD707-D9CF-40AE-B4C6-C98DA3205C09}" type="datetimeFigureOut">
               <a:rPr lang="en-US"/>
-              <a:t>2/22/2024</a:t>
+              <a:t>2/28/2024</a:t>
             </a:fld>
             <a:endParaRPr lang="en-US"/>
           </a:p>
@@ -664,7 +664,7 @@
           <a:p>
             <a:fld id="{1D8BD707-D9CF-40AE-B4C6-C98DA3205C09}" type="datetimeFigureOut">
               <a:rPr lang="en-US"/>
-              <a:t>2/22/2024</a:t>
+              <a:t>2/28/2024</a:t>
             </a:fld>
             <a:endParaRPr lang="en-US"/>
           </a:p>
@@ -864,7 +864,7 @@
           <a:p>
             <a:fld id="{1D8BD707-D9CF-40AE-B4C6-C98DA3205C09}" type="datetimeFigureOut">
               <a:rPr lang="en-US"/>
-              <a:t>2/22/2024</a:t>
+              <a:t>2/28/2024</a:t>
             </a:fld>
             <a:endParaRPr lang="en-US"/>
           </a:p>
@@ -1035,7 +1035,7 @@
           <a:p>
             <a:fld id="{1D8BD707-D9CF-40AE-B4C6-C98DA3205C09}" type="datetimeFigureOut">
               <a:rPr lang="en-US"/>
-              <a:t>2/22/2024</a:t>
+              <a:t>2/28/2024</a:t>
             </a:fld>
             <a:endParaRPr lang="en-US"/>
           </a:p>
@@ -1282,7 +1282,7 @@
           <a:p>
             <a:fld id="{1D8BD707-D9CF-40AE-B4C6-C98DA3205C09}" type="datetimeFigureOut">
               <a:rPr lang="en-US"/>
-              <a:t>2/22/2024</a:t>
+              <a:t>2/28/2024</a:t>
             </a:fld>
             <a:endParaRPr lang="en-US"/>
           </a:p>
@@ -10876,7 +10876,7 @@
               </a:rPr>
               <a:t>nele</a:t>
             </a:r>
-            <a:endParaRPr sz="1300">
+            <a:endParaRPr sz="1300" dirty="0">
               <a:latin typeface="Times New Roman"/>
               <a:cs typeface="Times New Roman"/>
             </a:endParaRPr>
@@ -11179,7 +11179,7 @@
               </a:rPr>
               <a:t>aplicações</a:t>
             </a:r>
-            <a:endParaRPr sz="1300">
+            <a:endParaRPr sz="1300" dirty="0">
               <a:latin typeface="Times New Roman"/>
               <a:cs typeface="Times New Roman"/>
             </a:endParaRPr>
@@ -11349,7 +11349,7 @@
               </a:rPr>
               <a:t>.</a:t>
             </a:r>
-            <a:endParaRPr sz="1200">
+            <a:endParaRPr sz="1200" dirty="0">
               <a:latin typeface="Times New Roman"/>
               <a:cs typeface="Times New Roman"/>
             </a:endParaRPr>
@@ -11485,13 +11485,13 @@
               <a:t> </a:t>
             </a:r>
             <a:r>
-              <a:rPr sz="1200" spc="-10" dirty="0">
-                <a:latin typeface="Times New Roman"/>
-                <a:cs typeface="Times New Roman"/>
-              </a:rPr>
-              <a:t>artigo</a:t>
-            </a:r>
-            <a:endParaRPr sz="1200">
+              <a:rPr lang="pt-BR" sz="1200" spc="-10" smtClean="0">
+                <a:latin typeface="Times New Roman"/>
+                <a:cs typeface="Times New Roman"/>
+              </a:rPr>
+              <a:t>arquivo.</a:t>
+            </a:r>
+            <a:endParaRPr sz="1200" dirty="0">
               <a:latin typeface="Times New Roman"/>
               <a:cs typeface="Times New Roman"/>
             </a:endParaRPr>

</xml_diff>